<commit_message>
feat: Add Dashboard Metrics ADO
</commit_message>
<xml_diff>
--- a/docs/Slide.pptx
+++ b/docs/Slide.pptx
@@ -13,9 +13,10 @@
     <p:sldId id="268" r:id="rId7"/>
     <p:sldId id="260" r:id="rId8"/>
     <p:sldId id="273" r:id="rId9"/>
-    <p:sldId id="269" r:id="rId10"/>
-    <p:sldId id="270" r:id="rId11"/>
-    <p:sldId id="271" r:id="rId12"/>
+    <p:sldId id="274" r:id="rId10"/>
+    <p:sldId id="269" r:id="rId11"/>
+    <p:sldId id="270" r:id="rId12"/>
+    <p:sldId id="271" r:id="rId13"/>
   </p:sldIdLst>
   <p:sldSz cx="12192000" cy="6858000"/>
   <p:notesSz cx="6858000" cy="9144000"/>
@@ -3695,6 +3696,514 @@
           </a:extLst>
         </p:spPr>
       </p:pic>
+      <p:sp>
+        <p:nvSpPr>
+          <p:cNvPr id="7" name="CuadroTexto 6">
+            <a:extLst>
+              <a:ext uri="{FF2B5EF4-FFF2-40B4-BE49-F238E27FC236}">
+                <a16:creationId xmlns:a16="http://schemas.microsoft.com/office/drawing/2014/main" id="{C06FD6B1-286F-4F7B-8EC4-646D2C8BB7BB}"/>
+              </a:ext>
+            </a:extLst>
+          </p:cNvPr>
+          <p:cNvSpPr txBox="1"/>
+          <p:nvPr/>
+        </p:nvSpPr>
+        <p:spPr>
+          <a:xfrm>
+            <a:off x="794760" y="3121082"/>
+            <a:ext cx="2212135" cy="1785104"/>
+          </a:xfrm>
+          <a:prstGeom prst="rect">
+            <a:avLst/>
+          </a:prstGeom>
+          <a:noFill/>
+        </p:spPr>
+        <p:txBody>
+          <a:bodyPr wrap="square">
+            <a:spAutoFit/>
+          </a:bodyPr>
+          <a:lstStyle/>
+          <a:p>
+            <a:pPr algn="ctr"/>
+            <a:r>
+              <a:rPr lang="en-US" sz="1100" b="1"/>
+              <a:t>Fairness:</a:t>
+            </a:r>
+            <a:r>
+              <a:rPr lang="en-US" sz="1100"/>
+              <a:t> Ensure fairness by basing all decisions on corporate policies, defined roles, and permissions, eliminating subjective or human bias. Requests are processed consistently and uniformly for all employees, ensuring that access to resources or the execution of actions is granted solely according to formal and verifiable criteria.</a:t>
+            </a:r>
+            <a:endParaRPr lang="es-MX" sz="1100" dirty="0">
+              <a:ea typeface="+mn-lt"/>
+              <a:cs typeface="+mn-lt"/>
+            </a:endParaRPr>
+          </a:p>
+        </p:txBody>
+      </p:sp>
+      <p:sp>
+        <p:nvSpPr>
+          <p:cNvPr id="8" name="CuadroTexto 7">
+            <a:extLst>
+              <a:ext uri="{FF2B5EF4-FFF2-40B4-BE49-F238E27FC236}">
+                <a16:creationId xmlns:a16="http://schemas.microsoft.com/office/drawing/2014/main" id="{99A32DAC-7349-40EA-93ED-76DD7C268EE1}"/>
+              </a:ext>
+            </a:extLst>
+          </p:cNvPr>
+          <p:cNvSpPr txBox="1"/>
+          <p:nvPr/>
+        </p:nvSpPr>
+        <p:spPr>
+          <a:xfrm>
+            <a:off x="3171488" y="4507205"/>
+            <a:ext cx="2212135" cy="1708160"/>
+          </a:xfrm>
+          <a:prstGeom prst="rect">
+            <a:avLst/>
+          </a:prstGeom>
+          <a:noFill/>
+        </p:spPr>
+        <p:txBody>
+          <a:bodyPr wrap="square">
+            <a:spAutoFit/>
+          </a:bodyPr>
+          <a:lstStyle/>
+          <a:p>
+            <a:pPr algn="ctr"/>
+            <a:r>
+              <a:rPr lang="en-US" sz="1050" b="1"/>
+              <a:t>Reliability and Security:</a:t>
+            </a:r>
+            <a:r>
+              <a:rPr lang="en-US" sz="1050"/>
+              <a:t> Ensure that all actions are executed exclusively through controlled and audited Azure DevOps pipelines, preventing direct or unexpected access. Each operation includes pre-execution validations, secure execution, full traceability, and technical evidence, guaranteeing operational safety and reducing risks.</a:t>
+            </a:r>
+            <a:endParaRPr lang="es-MX" sz="1050" dirty="0">
+              <a:ea typeface="+mn-lt"/>
+              <a:cs typeface="+mn-lt"/>
+            </a:endParaRPr>
+          </a:p>
+        </p:txBody>
+      </p:sp>
+      <p:sp>
+        <p:nvSpPr>
+          <p:cNvPr id="16" name="CuadroTexto 15">
+            <a:extLst>
+              <a:ext uri="{FF2B5EF4-FFF2-40B4-BE49-F238E27FC236}">
+                <a16:creationId xmlns:a16="http://schemas.microsoft.com/office/drawing/2014/main" id="{CD443A57-72EF-4DE6-8049-1087DEA84758}"/>
+              </a:ext>
+            </a:extLst>
+          </p:cNvPr>
+          <p:cNvSpPr txBox="1"/>
+          <p:nvPr/>
+        </p:nvSpPr>
+        <p:spPr>
+          <a:xfrm>
+            <a:off x="5776359" y="3288866"/>
+            <a:ext cx="2212135" cy="2123658"/>
+          </a:xfrm>
+          <a:prstGeom prst="rect">
+            <a:avLst/>
+          </a:prstGeom>
+          <a:noFill/>
+        </p:spPr>
+        <p:txBody>
+          <a:bodyPr wrap="square">
+            <a:spAutoFit/>
+          </a:bodyPr>
+          <a:lstStyle/>
+          <a:p>
+            <a:pPr algn="ctr"/>
+            <a:r>
+              <a:rPr lang="en-US" sz="1100" b="1"/>
+              <a:t>Privacy and Data Security:</a:t>
+            </a:r>
+            <a:r>
+              <a:rPr lang="en-US" sz="1100"/>
+              <a:t> Maintain privacy by using only the information necessary to validate the employee’s permissions and role, without storing personal data outside authorized channels. All communication with Azure DevOps uses encrypted credentials, and access is restricted and auditable, ensuring compliance with internal policies and data protection standards.</a:t>
+            </a:r>
+            <a:endParaRPr lang="es-MX" sz="1100" dirty="0">
+              <a:ea typeface="+mn-lt"/>
+              <a:cs typeface="+mn-lt"/>
+            </a:endParaRPr>
+          </a:p>
+        </p:txBody>
+      </p:sp>
+      <p:sp>
+        <p:nvSpPr>
+          <p:cNvPr id="18" name="CuadroTexto 17">
+            <a:extLst>
+              <a:ext uri="{FF2B5EF4-FFF2-40B4-BE49-F238E27FC236}">
+                <a16:creationId xmlns:a16="http://schemas.microsoft.com/office/drawing/2014/main" id="{FF1DDC83-35D6-4A2F-B1BD-31389F64AB60}"/>
+              </a:ext>
+            </a:extLst>
+          </p:cNvPr>
+          <p:cNvSpPr txBox="1"/>
+          <p:nvPr/>
+        </p:nvSpPr>
+        <p:spPr>
+          <a:xfrm>
+            <a:off x="8630307" y="4507205"/>
+            <a:ext cx="2668813" cy="1446550"/>
+          </a:xfrm>
+          <a:prstGeom prst="rect">
+            <a:avLst/>
+          </a:prstGeom>
+          <a:noFill/>
+        </p:spPr>
+        <p:txBody>
+          <a:bodyPr wrap="square">
+            <a:spAutoFit/>
+          </a:bodyPr>
+          <a:lstStyle/>
+          <a:p>
+            <a:pPr algn="ctr"/>
+            <a:r>
+              <a:rPr lang="en-US" sz="1100" b="1"/>
+              <a:t>Inclusion:</a:t>
+            </a:r>
+            <a:r>
+              <a:rPr lang="en-US" sz="1100"/>
+              <a:t> Design the system so that any employee, regardless of technical background, can interact in natural language through multiple channels such as Teams, Web, or Chatbots. Responses are clear, accessible, and easy to understand so that any user can follow the process and its outcome without technical knowledge.</a:t>
+            </a:r>
+            <a:endParaRPr lang="es-MX" sz="1100" dirty="0">
+              <a:ea typeface="+mn-lt"/>
+              <a:cs typeface="+mn-lt"/>
+            </a:endParaRPr>
+          </a:p>
+        </p:txBody>
+      </p:sp>
+      <p:pic>
+        <p:nvPicPr>
+          <p:cNvPr id="21" name="Imagen 20">
+            <a:extLst>
+              <a:ext uri="{FF2B5EF4-FFF2-40B4-BE49-F238E27FC236}">
+                <a16:creationId xmlns:a16="http://schemas.microsoft.com/office/drawing/2014/main" id="{BD0AD10E-93D3-4DBB-A198-B17D66C34B2D}"/>
+              </a:ext>
+            </a:extLst>
+          </p:cNvPr>
+          <p:cNvPicPr>
+            <a:picLocks noChangeAspect="1"/>
+          </p:cNvPicPr>
+          <p:nvPr/>
+        </p:nvPicPr>
+        <p:blipFill>
+          <a:blip r:embed="rId4"/>
+          <a:stretch>
+            <a:fillRect/>
+          </a:stretch>
+        </p:blipFill>
+        <p:spPr>
+          <a:xfrm>
+            <a:off x="1257891" y="1564697"/>
+            <a:ext cx="1285875" cy="1323975"/>
+          </a:xfrm>
+          <a:prstGeom prst="roundRect">
+            <a:avLst>
+              <a:gd name="adj" fmla="val 8594"/>
+            </a:avLst>
+          </a:prstGeom>
+          <a:solidFill>
+            <a:srgbClr val="FFFFFF">
+              <a:shade val="85000"/>
+            </a:srgbClr>
+          </a:solidFill>
+          <a:ln>
+            <a:noFill/>
+          </a:ln>
+          <a:effectLst>
+            <a:reflection blurRad="12700" stA="38000" endPos="28000" dist="5000" dir="5400000" sy="-100000" algn="bl" rotWithShape="0"/>
+          </a:effectLst>
+        </p:spPr>
+      </p:pic>
+      <p:pic>
+        <p:nvPicPr>
+          <p:cNvPr id="23" name="Imagen 22">
+            <a:extLst>
+              <a:ext uri="{FF2B5EF4-FFF2-40B4-BE49-F238E27FC236}">
+                <a16:creationId xmlns:a16="http://schemas.microsoft.com/office/drawing/2014/main" id="{F715CCCD-0B67-4FF0-BAB1-11434EC43046}"/>
+              </a:ext>
+            </a:extLst>
+          </p:cNvPr>
+          <p:cNvPicPr>
+            <a:picLocks noChangeAspect="1"/>
+          </p:cNvPicPr>
+          <p:nvPr/>
+        </p:nvPicPr>
+        <p:blipFill>
+          <a:blip r:embed="rId5"/>
+          <a:stretch>
+            <a:fillRect/>
+          </a:stretch>
+        </p:blipFill>
+        <p:spPr>
+          <a:xfrm>
+            <a:off x="3639381" y="2762250"/>
+            <a:ext cx="1276350" cy="1333500"/>
+          </a:xfrm>
+          <a:prstGeom prst="roundRect">
+            <a:avLst>
+              <a:gd name="adj" fmla="val 8594"/>
+            </a:avLst>
+          </a:prstGeom>
+          <a:solidFill>
+            <a:srgbClr val="FFFFFF">
+              <a:shade val="85000"/>
+            </a:srgbClr>
+          </a:solidFill>
+          <a:ln>
+            <a:noFill/>
+          </a:ln>
+          <a:effectLst>
+            <a:reflection blurRad="12700" stA="38000" endPos="28000" dist="5000" dir="5400000" sy="-100000" algn="bl" rotWithShape="0"/>
+          </a:effectLst>
+        </p:spPr>
+      </p:pic>
+      <p:pic>
+        <p:nvPicPr>
+          <p:cNvPr id="25" name="Imagen 24">
+            <a:extLst>
+              <a:ext uri="{FF2B5EF4-FFF2-40B4-BE49-F238E27FC236}">
+                <a16:creationId xmlns:a16="http://schemas.microsoft.com/office/drawing/2014/main" id="{3D8DE8A6-9C02-4718-ADB1-73855B8DB90C}"/>
+              </a:ext>
+            </a:extLst>
+          </p:cNvPr>
+          <p:cNvPicPr>
+            <a:picLocks noChangeAspect="1"/>
+          </p:cNvPicPr>
+          <p:nvPr/>
+        </p:nvPicPr>
+        <p:blipFill>
+          <a:blip r:embed="rId6"/>
+          <a:stretch>
+            <a:fillRect/>
+          </a:stretch>
+        </p:blipFill>
+        <p:spPr>
+          <a:xfrm>
+            <a:off x="6234726" y="1564697"/>
+            <a:ext cx="1295400" cy="1371600"/>
+          </a:xfrm>
+          <a:prstGeom prst="roundRect">
+            <a:avLst>
+              <a:gd name="adj" fmla="val 8594"/>
+            </a:avLst>
+          </a:prstGeom>
+          <a:solidFill>
+            <a:srgbClr val="FFFFFF">
+              <a:shade val="85000"/>
+            </a:srgbClr>
+          </a:solidFill>
+          <a:ln>
+            <a:noFill/>
+          </a:ln>
+          <a:effectLst>
+            <a:reflection blurRad="12700" stA="38000" endPos="28000" dist="5000" dir="5400000" sy="-100000" algn="bl" rotWithShape="0"/>
+          </a:effectLst>
+        </p:spPr>
+      </p:pic>
+      <p:pic>
+        <p:nvPicPr>
+          <p:cNvPr id="27" name="Imagen 26">
+            <a:extLst>
+              <a:ext uri="{FF2B5EF4-FFF2-40B4-BE49-F238E27FC236}">
+                <a16:creationId xmlns:a16="http://schemas.microsoft.com/office/drawing/2014/main" id="{7C8A1BDC-AC9B-4E51-AA6A-8563D755D64D}"/>
+              </a:ext>
+            </a:extLst>
+          </p:cNvPr>
+          <p:cNvPicPr>
+            <a:picLocks noChangeAspect="1"/>
+          </p:cNvPicPr>
+          <p:nvPr/>
+        </p:nvPicPr>
+        <p:blipFill>
+          <a:blip r:embed="rId7"/>
+          <a:stretch>
+            <a:fillRect/>
+          </a:stretch>
+        </p:blipFill>
+        <p:spPr>
+          <a:xfrm>
+            <a:off x="9307489" y="2762250"/>
+            <a:ext cx="1314450" cy="1343025"/>
+          </a:xfrm>
+          <a:prstGeom prst="roundRect">
+            <a:avLst>
+              <a:gd name="adj" fmla="val 8594"/>
+            </a:avLst>
+          </a:prstGeom>
+          <a:solidFill>
+            <a:srgbClr val="FFFFFF">
+              <a:shade val="85000"/>
+            </a:srgbClr>
+          </a:solidFill>
+          <a:ln>
+            <a:noFill/>
+          </a:ln>
+          <a:effectLst>
+            <a:reflection blurRad="12700" stA="38000" endPos="28000" dist="5000" dir="5400000" sy="-100000" algn="bl" rotWithShape="0"/>
+          </a:effectLst>
+        </p:spPr>
+      </p:pic>
+    </p:spTree>
+    <p:extLst>
+      <p:ext uri="{BB962C8B-B14F-4D97-AF65-F5344CB8AC3E}">
+        <p14:creationId xmlns:p14="http://schemas.microsoft.com/office/powerpoint/2010/main" val="987234582"/>
+      </p:ext>
+    </p:extLst>
+  </p:cSld>
+  <p:clrMapOvr>
+    <a:masterClrMapping/>
+  </p:clrMapOvr>
+</p:sld>
+</file>
+
+<file path=ppt/slides/slide11.xml><?xml version="1.0" encoding="utf-8"?>
+<p:sld xmlns:a="http://schemas.openxmlformats.org/drawingml/2006/main" xmlns:r="http://schemas.openxmlformats.org/officeDocument/2006/relationships" xmlns:p="http://schemas.openxmlformats.org/presentationml/2006/main">
+  <p:cSld>
+    <p:spTree>
+      <p:nvGrpSpPr>
+        <p:cNvPr id="1" name=""/>
+        <p:cNvGrpSpPr/>
+        <p:nvPr/>
+      </p:nvGrpSpPr>
+      <p:grpSpPr>
+        <a:xfrm>
+          <a:off x="0" y="0"/>
+          <a:ext cx="0" cy="0"/>
+          <a:chOff x="0" y="0"/>
+          <a:chExt cx="0" cy="0"/>
+        </a:xfrm>
+      </p:grpSpPr>
+      <p:sp>
+        <p:nvSpPr>
+          <p:cNvPr id="2" name="Título 1">
+            <a:extLst>
+              <a:ext uri="{FF2B5EF4-FFF2-40B4-BE49-F238E27FC236}">
+                <a16:creationId xmlns:a16="http://schemas.microsoft.com/office/drawing/2014/main" id="{A61584EB-CE43-4ABC-AF2F-05BD2CB18B46}"/>
+              </a:ext>
+            </a:extLst>
+          </p:cNvPr>
+          <p:cNvSpPr>
+            <a:spLocks noGrp="1"/>
+          </p:cNvSpPr>
+          <p:nvPr>
+            <p:ph type="title"/>
+          </p:nvPr>
+        </p:nvSpPr>
+        <p:spPr/>
+        <p:txBody>
+          <a:bodyPr/>
+          <a:lstStyle/>
+          <a:p>
+            <a:r>
+              <a:rPr lang="es-MX" sz="4400" dirty="0"/>
+              <a:t>NexusDesk Copilot – </a:t>
+            </a:r>
+            <a:r>
+              <a:rPr lang="es-CO" sz="4400" dirty="0"/>
+              <a:t>R</a:t>
+            </a:r>
+            <a:r>
+              <a:rPr lang="es-CO" dirty="0"/>
+              <a:t>esponsable AI</a:t>
+            </a:r>
+          </a:p>
+        </p:txBody>
+      </p:sp>
+      <p:pic>
+        <p:nvPicPr>
+          <p:cNvPr id="4" name="Picture 6" descr="Microsoft | Microsoft Wiki | Fandom">
+            <a:extLst>
+              <a:ext uri="{FF2B5EF4-FFF2-40B4-BE49-F238E27FC236}">
+                <a16:creationId xmlns:a16="http://schemas.microsoft.com/office/drawing/2014/main" id="{6DBF9A4A-E0FC-4988-AA4C-78F7031B7BA6}"/>
+              </a:ext>
+            </a:extLst>
+          </p:cNvPr>
+          <p:cNvPicPr>
+            <a:picLocks noChangeAspect="1" noChangeArrowheads="1"/>
+          </p:cNvPicPr>
+          <p:nvPr/>
+        </p:nvPicPr>
+        <p:blipFill>
+          <a:blip r:embed="rId2">
+            <a:extLst>
+              <a:ext uri="{28A0092B-C50C-407E-A947-70E740481C1C}">
+                <a14:useLocalDpi xmlns:a14="http://schemas.microsoft.com/office/drawing/2010/main" val="0"/>
+              </a:ext>
+            </a:extLst>
+          </a:blip>
+          <a:srcRect/>
+          <a:stretch>
+            <a:fillRect/>
+          </a:stretch>
+        </p:blipFill>
+        <p:spPr bwMode="auto">
+          <a:xfrm>
+            <a:off x="114300" y="6389241"/>
+            <a:ext cx="1583837" cy="408501"/>
+          </a:xfrm>
+          <a:prstGeom prst="rect">
+            <a:avLst/>
+          </a:prstGeom>
+          <a:noFill/>
+          <a:extLst>
+            <a:ext uri="{909E8E84-426E-40DD-AFC4-6F175D3DCCD1}">
+              <a14:hiddenFill xmlns:a14="http://schemas.microsoft.com/office/drawing/2010/main">
+                <a:solidFill>
+                  <a:srgbClr val="FFFFFF"/>
+                </a:solidFill>
+              </a14:hiddenFill>
+            </a:ext>
+          </a:extLst>
+        </p:spPr>
+      </p:pic>
+      <p:pic>
+        <p:nvPicPr>
+          <p:cNvPr id="5" name="Picture 4" descr="Logo de Código Facilito">
+            <a:extLst>
+              <a:ext uri="{FF2B5EF4-FFF2-40B4-BE49-F238E27FC236}">
+                <a16:creationId xmlns:a16="http://schemas.microsoft.com/office/drawing/2014/main" id="{D3F29ABD-2778-4481-A95D-3AFE647D0A19}"/>
+              </a:ext>
+            </a:extLst>
+          </p:cNvPr>
+          <p:cNvPicPr>
+            <a:picLocks noChangeAspect="1" noChangeArrowheads="1"/>
+          </p:cNvPicPr>
+          <p:nvPr/>
+        </p:nvPicPr>
+        <p:blipFill>
+          <a:blip r:embed="rId3">
+            <a:extLst>
+              <a:ext uri="{28A0092B-C50C-407E-A947-70E740481C1C}">
+                <a14:useLocalDpi xmlns:a14="http://schemas.microsoft.com/office/drawing/2010/main" val="0"/>
+              </a:ext>
+            </a:extLst>
+          </a:blip>
+          <a:srcRect/>
+          <a:stretch>
+            <a:fillRect/>
+          </a:stretch>
+        </p:blipFill>
+        <p:spPr bwMode="auto">
+          <a:xfrm>
+            <a:off x="1816940" y="6419523"/>
+            <a:ext cx="2212135" cy="347935"/>
+          </a:xfrm>
+          <a:prstGeom prst="rect">
+            <a:avLst/>
+          </a:prstGeom>
+          <a:noFill/>
+          <a:extLst>
+            <a:ext uri="{909E8E84-426E-40DD-AFC4-6F175D3DCCD1}">
+              <a14:hiddenFill xmlns:a14="http://schemas.microsoft.com/office/drawing/2010/main">
+                <a:solidFill>
+                  <a:srgbClr val="FFFFFF"/>
+                </a:solidFill>
+              </a14:hiddenFill>
+            </a:ext>
+          </a:extLst>
+        </p:spPr>
+      </p:pic>
       <p:pic>
         <p:nvPicPr>
           <p:cNvPr id="4098" name="Picture 2">
@@ -3855,7 +4364,7 @@
 </p:sld>
 </file>
 
-<file path=ppt/slides/slide11.xml><?xml version="1.0" encoding="utf-8"?>
+<file path=ppt/slides/slide12.xml><?xml version="1.0" encoding="utf-8"?>
 <p:sld xmlns:a="http://schemas.openxmlformats.org/drawingml/2006/main" xmlns:r="http://schemas.openxmlformats.org/officeDocument/2006/relationships" xmlns:p="http://schemas.openxmlformats.org/presentationml/2006/main">
   <p:cSld>
     <p:spTree>
@@ -8239,17 +8748,12 @@
           <a:lstStyle/>
           <a:p>
             <a:r>
-              <a:rPr lang="es-MX" sz="4400" dirty="0"/>
-              <a:t>NexusDesk Copilot – </a:t>
-            </a:r>
-            <a:r>
-              <a:rPr lang="es-CO" sz="4400" dirty="0"/>
-              <a:t>R</a:t>
-            </a:r>
-            <a:r>
-              <a:rPr lang="es-CO" dirty="0"/>
-              <a:t>esponsable AI</a:t>
-            </a:r>
+              <a:rPr lang="en-US" dirty="0">
+                <a:cs typeface="Calibri Light"/>
+              </a:rPr>
+              <a:t>Dashboard Metrics</a:t>
+            </a:r>
+            <a:endParaRPr lang="en-US" dirty="0"/>
           </a:p>
         </p:txBody>
       </p:sp>
@@ -8349,186 +8853,54 @@
       </p:pic>
       <p:sp>
         <p:nvSpPr>
-          <p:cNvPr id="7" name="CuadroTexto 6">
-            <a:extLst>
-              <a:ext uri="{FF2B5EF4-FFF2-40B4-BE49-F238E27FC236}">
-                <a16:creationId xmlns:a16="http://schemas.microsoft.com/office/drawing/2014/main" id="{C06FD6B1-286F-4F7B-8EC4-646D2C8BB7BB}"/>
-              </a:ext>
-            </a:extLst>
-          </p:cNvPr>
-          <p:cNvSpPr txBox="1"/>
-          <p:nvPr/>
+          <p:cNvPr id="6" name="Marcador de contenido 5">
+            <a:extLst>
+              <a:ext uri="{FF2B5EF4-FFF2-40B4-BE49-F238E27FC236}">
+                <a16:creationId xmlns:a16="http://schemas.microsoft.com/office/drawing/2014/main" id="{3E1D18CA-F1A8-4C59-B70F-3C8D0DC0A2BE}"/>
+              </a:ext>
+            </a:extLst>
+          </p:cNvPr>
+          <p:cNvSpPr>
+            <a:spLocks noGrp="1"/>
+          </p:cNvSpPr>
+          <p:nvPr>
+            <p:ph idx="1"/>
+          </p:nvPr>
         </p:nvSpPr>
         <p:spPr>
           <a:xfrm>
-            <a:off x="794760" y="3121082"/>
-            <a:ext cx="2212135" cy="1785104"/>
-          </a:xfrm>
-          <a:prstGeom prst="rect">
-            <a:avLst/>
-          </a:prstGeom>
-          <a:noFill/>
-        </p:spPr>
-        <p:txBody>
-          <a:bodyPr wrap="square">
-            <a:spAutoFit/>
+            <a:off x="838200" y="1825625"/>
+            <a:ext cx="3983182" cy="2247611"/>
+          </a:xfrm>
+        </p:spPr>
+        <p:txBody>
+          <a:bodyPr>
+            <a:normAutofit/>
           </a:bodyPr>
           <a:lstStyle/>
           <a:p>
-            <a:pPr algn="ctr"/>
-            <a:r>
-              <a:rPr lang="en-US" sz="1100" b="1"/>
-              <a:t>Fairness:</a:t>
-            </a:r>
-            <a:r>
-              <a:rPr lang="en-US" sz="1100"/>
-              <a:t> Ensure fairness by basing all decisions on corporate policies, defined roles, and permissions, eliminating subjective or human bias. Requests are processed consistently and uniformly for all employees, ensuring that access to resources or the execution of actions is granted solely according to formal and verifiable criteria.</a:t>
-            </a:r>
-            <a:endParaRPr lang="es-MX" sz="1100" dirty="0">
-              <a:ea typeface="+mn-lt"/>
-              <a:cs typeface="+mn-lt"/>
-            </a:endParaRPr>
-          </a:p>
-        </p:txBody>
-      </p:sp>
-      <p:sp>
-        <p:nvSpPr>
-          <p:cNvPr id="8" name="CuadroTexto 7">
-            <a:extLst>
-              <a:ext uri="{FF2B5EF4-FFF2-40B4-BE49-F238E27FC236}">
-                <a16:creationId xmlns:a16="http://schemas.microsoft.com/office/drawing/2014/main" id="{99A32DAC-7349-40EA-93ED-76DD7C268EE1}"/>
-              </a:ext>
-            </a:extLst>
-          </p:cNvPr>
-          <p:cNvSpPr txBox="1"/>
-          <p:nvPr/>
-        </p:nvSpPr>
-        <p:spPr>
-          <a:xfrm>
-            <a:off x="3171488" y="4507205"/>
-            <a:ext cx="2212135" cy="1708160"/>
-          </a:xfrm>
-          <a:prstGeom prst="rect">
-            <a:avLst/>
-          </a:prstGeom>
-          <a:noFill/>
-        </p:spPr>
-        <p:txBody>
-          <a:bodyPr wrap="square">
-            <a:spAutoFit/>
-          </a:bodyPr>
-          <a:lstStyle/>
-          <a:p>
-            <a:pPr algn="ctr"/>
-            <a:r>
-              <a:rPr lang="en-US" sz="1050" b="1"/>
-              <a:t>Reliability and Security:</a:t>
-            </a:r>
-            <a:r>
-              <a:rPr lang="en-US" sz="1050"/>
-              <a:t> Ensure that all actions are executed exclusively through controlled and audited Azure DevOps pipelines, preventing direct or unexpected access. Each operation includes pre-execution validations, secure execution, full traceability, and technical evidence, guaranteeing operational safety and reducing risks.</a:t>
-            </a:r>
-            <a:endParaRPr lang="es-MX" sz="1050" dirty="0">
-              <a:ea typeface="+mn-lt"/>
-              <a:cs typeface="+mn-lt"/>
-            </a:endParaRPr>
-          </a:p>
-        </p:txBody>
-      </p:sp>
-      <p:sp>
-        <p:nvSpPr>
-          <p:cNvPr id="16" name="CuadroTexto 15">
-            <a:extLst>
-              <a:ext uri="{FF2B5EF4-FFF2-40B4-BE49-F238E27FC236}">
-                <a16:creationId xmlns:a16="http://schemas.microsoft.com/office/drawing/2014/main" id="{CD443A57-72EF-4DE6-8049-1087DEA84758}"/>
-              </a:ext>
-            </a:extLst>
-          </p:cNvPr>
-          <p:cNvSpPr txBox="1"/>
-          <p:nvPr/>
-        </p:nvSpPr>
-        <p:spPr>
-          <a:xfrm>
-            <a:off x="5776359" y="3288866"/>
-            <a:ext cx="2212135" cy="2123658"/>
-          </a:xfrm>
-          <a:prstGeom prst="rect">
-            <a:avLst/>
-          </a:prstGeom>
-          <a:noFill/>
-        </p:spPr>
-        <p:txBody>
-          <a:bodyPr wrap="square">
-            <a:spAutoFit/>
-          </a:bodyPr>
-          <a:lstStyle/>
-          <a:p>
-            <a:pPr algn="ctr"/>
-            <a:r>
-              <a:rPr lang="en-US" sz="1100" b="1"/>
-              <a:t>Privacy and Data Security:</a:t>
-            </a:r>
-            <a:r>
-              <a:rPr lang="en-US" sz="1100"/>
-              <a:t> Maintain privacy by using only the information necessary to validate the employee’s permissions and role, without storing personal data outside authorized channels. All communication with Azure DevOps uses encrypted credentials, and access is restricted and auditable, ensuring compliance with internal policies and data protection standards.</a:t>
-            </a:r>
-            <a:endParaRPr lang="es-MX" sz="1100" dirty="0">
-              <a:ea typeface="+mn-lt"/>
-              <a:cs typeface="+mn-lt"/>
-            </a:endParaRPr>
-          </a:p>
-        </p:txBody>
-      </p:sp>
-      <p:sp>
-        <p:nvSpPr>
-          <p:cNvPr id="18" name="CuadroTexto 17">
-            <a:extLst>
-              <a:ext uri="{FF2B5EF4-FFF2-40B4-BE49-F238E27FC236}">
-                <a16:creationId xmlns:a16="http://schemas.microsoft.com/office/drawing/2014/main" id="{FF1DDC83-35D6-4A2F-B1BD-31389F64AB60}"/>
-              </a:ext>
-            </a:extLst>
-          </p:cNvPr>
-          <p:cNvSpPr txBox="1"/>
-          <p:nvPr/>
-        </p:nvSpPr>
-        <p:spPr>
-          <a:xfrm>
-            <a:off x="8630307" y="4507205"/>
-            <a:ext cx="2668813" cy="1446550"/>
-          </a:xfrm>
-          <a:prstGeom prst="rect">
-            <a:avLst/>
-          </a:prstGeom>
-          <a:noFill/>
-        </p:spPr>
-        <p:txBody>
-          <a:bodyPr wrap="square">
-            <a:spAutoFit/>
-          </a:bodyPr>
-          <a:lstStyle/>
-          <a:p>
-            <a:pPr algn="ctr"/>
-            <a:r>
-              <a:rPr lang="en-US" sz="1100" b="1"/>
-              <a:t>Inclusion:</a:t>
-            </a:r>
-            <a:r>
-              <a:rPr lang="en-US" sz="1100"/>
-              <a:t> Design the system so that any employee, regardless of technical background, can interact in natural language through multiple channels such as Teams, Web, or Chatbots. Responses are clear, accessible, and easy to understand so that any user can follow the process and its outcome without technical knowledge.</a:t>
-            </a:r>
-            <a:endParaRPr lang="es-MX" sz="1100" dirty="0">
-              <a:ea typeface="+mn-lt"/>
-              <a:cs typeface="+mn-lt"/>
-            </a:endParaRPr>
+            <a:r>
+              <a:rPr lang="en-US" sz="1400" dirty="0"/>
+              <a:t>The </a:t>
+            </a:r>
+            <a:r>
+              <a:rPr lang="en-US" sz="1400" b="1" dirty="0"/>
+              <a:t>Metrics Dashboard</a:t>
+            </a:r>
+            <a:r>
+              <a:rPr lang="en-US" sz="1400" dirty="0"/>
+              <a:t> centralizes the operational performance of NexusDesk Copilot within Azure DevOps, providing real-time visibility into the volume of tasks generated, automatically resolved by AI agents, and those that require human escalation. Through distribution charts, trend lines, and dynamic tables, the dashboard highlights the system’s ability to process requests, the effort invested by category, and the performance of each agent or team member. </a:t>
+            </a:r>
+            <a:endParaRPr lang="es-CO" sz="1400" dirty="0"/>
           </a:p>
         </p:txBody>
       </p:sp>
       <p:pic>
         <p:nvPicPr>
-          <p:cNvPr id="21" name="Imagen 20">
-            <a:extLst>
-              <a:ext uri="{FF2B5EF4-FFF2-40B4-BE49-F238E27FC236}">
-                <a16:creationId xmlns:a16="http://schemas.microsoft.com/office/drawing/2014/main" id="{BD0AD10E-93D3-4DBB-A198-B17D66C34B2D}"/>
+          <p:cNvPr id="16" name="Imagen 15">
+            <a:extLst>
+              <a:ext uri="{FF2B5EF4-FFF2-40B4-BE49-F238E27FC236}">
+                <a16:creationId xmlns:a16="http://schemas.microsoft.com/office/drawing/2014/main" id="{D5F8C37F-EB58-4C7D-A921-DDF38EFD4C7D}"/>
               </a:ext>
             </a:extLst>
           </p:cNvPr>
@@ -8545,160 +8917,64 @@
         </p:blipFill>
         <p:spPr>
           <a:xfrm>
-            <a:off x="1257891" y="1564697"/>
-            <a:ext cx="1285875" cy="1323975"/>
-          </a:xfrm>
-          <a:prstGeom prst="roundRect">
-            <a:avLst>
-              <a:gd name="adj" fmla="val 8594"/>
-            </a:avLst>
+            <a:off x="5066052" y="1758156"/>
+            <a:ext cx="6634903" cy="3641600"/>
+          </a:xfrm>
+          <a:prstGeom prst="rect">
+            <a:avLst/>
           </a:prstGeom>
-          <a:solidFill>
-            <a:srgbClr val="FFFFFF">
-              <a:shade val="85000"/>
-            </a:srgbClr>
-          </a:solidFill>
           <a:ln>
             <a:noFill/>
           </a:ln>
           <a:effectLst>
-            <a:reflection blurRad="12700" stA="38000" endPos="28000" dist="5000" dir="5400000" sy="-100000" algn="bl" rotWithShape="0"/>
+            <a:outerShdw blurRad="190500" algn="tl" rotWithShape="0">
+              <a:srgbClr val="000000">
+                <a:alpha val="70000"/>
+              </a:srgbClr>
+            </a:outerShdw>
           </a:effectLst>
         </p:spPr>
       </p:pic>
-      <p:pic>
-        <p:nvPicPr>
-          <p:cNvPr id="23" name="Imagen 22">
-            <a:extLst>
-              <a:ext uri="{FF2B5EF4-FFF2-40B4-BE49-F238E27FC236}">
-                <a16:creationId xmlns:a16="http://schemas.microsoft.com/office/drawing/2014/main" id="{F715CCCD-0B67-4FF0-BAB1-11434EC43046}"/>
-              </a:ext>
-            </a:extLst>
-          </p:cNvPr>
-          <p:cNvPicPr>
-            <a:picLocks noChangeAspect="1"/>
-          </p:cNvPicPr>
+      <p:sp>
+        <p:nvSpPr>
+          <p:cNvPr id="18" name="CuadroTexto 17">
+            <a:extLst>
+              <a:ext uri="{FF2B5EF4-FFF2-40B4-BE49-F238E27FC236}">
+                <a16:creationId xmlns:a16="http://schemas.microsoft.com/office/drawing/2014/main" id="{54C1CEF5-9FE4-40F5-9A1A-297709469E32}"/>
+              </a:ext>
+            </a:extLst>
+          </p:cNvPr>
+          <p:cNvSpPr txBox="1"/>
           <p:nvPr/>
-        </p:nvPicPr>
-        <p:blipFill>
-          <a:blip r:embed="rId5"/>
-          <a:stretch>
-            <a:fillRect/>
-          </a:stretch>
-        </p:blipFill>
+        </p:nvSpPr>
         <p:spPr>
           <a:xfrm>
-            <a:off x="3639381" y="2762250"/>
-            <a:ext cx="1276350" cy="1333500"/>
-          </a:xfrm>
-          <a:prstGeom prst="roundRect">
-            <a:avLst>
-              <a:gd name="adj" fmla="val 8594"/>
-            </a:avLst>
+            <a:off x="5334811" y="5566964"/>
+            <a:ext cx="6097384" cy="1015663"/>
+          </a:xfrm>
+          <a:prstGeom prst="rect">
+            <a:avLst/>
           </a:prstGeom>
-          <a:solidFill>
-            <a:srgbClr val="FFFFFF">
-              <a:shade val="85000"/>
-            </a:srgbClr>
-          </a:solidFill>
-          <a:ln>
-            <a:noFill/>
-          </a:ln>
-          <a:effectLst>
-            <a:reflection blurRad="12700" stA="38000" endPos="28000" dist="5000" dir="5400000" sy="-100000" algn="bl" rotWithShape="0"/>
-          </a:effectLst>
-        </p:spPr>
-      </p:pic>
-      <p:pic>
-        <p:nvPicPr>
-          <p:cNvPr id="25" name="Imagen 24">
-            <a:extLst>
-              <a:ext uri="{FF2B5EF4-FFF2-40B4-BE49-F238E27FC236}">
-                <a16:creationId xmlns:a16="http://schemas.microsoft.com/office/drawing/2014/main" id="{3D8DE8A6-9C02-4718-ADB1-73855B8DB90C}"/>
-              </a:ext>
-            </a:extLst>
-          </p:cNvPr>
-          <p:cNvPicPr>
-            <a:picLocks noChangeAspect="1"/>
-          </p:cNvPicPr>
-          <p:nvPr/>
-        </p:nvPicPr>
-        <p:blipFill>
-          <a:blip r:embed="rId6"/>
-          <a:stretch>
-            <a:fillRect/>
-          </a:stretch>
-        </p:blipFill>
-        <p:spPr>
-          <a:xfrm>
-            <a:off x="6234726" y="1564697"/>
-            <a:ext cx="1295400" cy="1371600"/>
-          </a:xfrm>
-          <a:prstGeom prst="roundRect">
-            <a:avLst>
-              <a:gd name="adj" fmla="val 8594"/>
-            </a:avLst>
-          </a:prstGeom>
-          <a:solidFill>
-            <a:srgbClr val="FFFFFF">
-              <a:shade val="85000"/>
-            </a:srgbClr>
-          </a:solidFill>
-          <a:ln>
-            <a:noFill/>
-          </a:ln>
-          <a:effectLst>
-            <a:reflection blurRad="12700" stA="38000" endPos="28000" dist="5000" dir="5400000" sy="-100000" algn="bl" rotWithShape="0"/>
-          </a:effectLst>
-        </p:spPr>
-      </p:pic>
-      <p:pic>
-        <p:nvPicPr>
-          <p:cNvPr id="27" name="Imagen 26">
-            <a:extLst>
-              <a:ext uri="{FF2B5EF4-FFF2-40B4-BE49-F238E27FC236}">
-                <a16:creationId xmlns:a16="http://schemas.microsoft.com/office/drawing/2014/main" id="{7C8A1BDC-AC9B-4E51-AA6A-8563D755D64D}"/>
-              </a:ext>
-            </a:extLst>
-          </p:cNvPr>
-          <p:cNvPicPr>
-            <a:picLocks noChangeAspect="1"/>
-          </p:cNvPicPr>
-          <p:nvPr/>
-        </p:nvPicPr>
-        <p:blipFill>
-          <a:blip r:embed="rId7"/>
-          <a:stretch>
-            <a:fillRect/>
-          </a:stretch>
-        </p:blipFill>
-        <p:spPr>
-          <a:xfrm>
-            <a:off x="9307489" y="2762250"/>
-            <a:ext cx="1314450" cy="1343025"/>
-          </a:xfrm>
-          <a:prstGeom prst="roundRect">
-            <a:avLst>
-              <a:gd name="adj" fmla="val 8594"/>
-            </a:avLst>
-          </a:prstGeom>
-          <a:solidFill>
-            <a:srgbClr val="FFFFFF">
-              <a:shade val="85000"/>
-            </a:srgbClr>
-          </a:solidFill>
-          <a:ln>
-            <a:noFill/>
-          </a:ln>
-          <a:effectLst>
-            <a:reflection blurRad="12700" stA="38000" endPos="28000" dist="5000" dir="5400000" sy="-100000" algn="bl" rotWithShape="0"/>
-          </a:effectLst>
-        </p:spPr>
-      </p:pic>
+          <a:noFill/>
+        </p:spPr>
+        <p:txBody>
+          <a:bodyPr wrap="square">
+            <a:spAutoFit/>
+          </a:bodyPr>
+          <a:lstStyle/>
+          <a:p>
+            <a:r>
+              <a:rPr lang="en-US" sz="1200" dirty="0"/>
+              <a:t>This unified view delivers key value by demonstrating operational transparency, identifying bottlenecks, measuring auto-resolution effectiveness, and showcasing the reduction of manual workload in the Service Desk. With these insights, stakeholders can easily evaluate the system’s impact, validate governance, and make informed decisions based on clear and traceable metrics.</a:t>
+            </a:r>
+            <a:endParaRPr lang="es-CO" sz="1200" dirty="0"/>
+          </a:p>
+        </p:txBody>
+      </p:sp>
     </p:spTree>
     <p:extLst>
       <p:ext uri="{BB962C8B-B14F-4D97-AF65-F5344CB8AC3E}">
-        <p14:creationId xmlns:p14="http://schemas.microsoft.com/office/powerpoint/2010/main" val="987234582"/>
+        <p14:creationId xmlns:p14="http://schemas.microsoft.com/office/powerpoint/2010/main" val="3810366876"/>
       </p:ext>
     </p:extLst>
   </p:cSld>

</xml_diff>